<commit_message>
Added more bar graphs and a scatter plot.
</commit_message>
<xml_diff>
--- a/Presentation1.pptx
+++ b/Presentation1.pptx
@@ -5,22 +5,25 @@
     <p:sldMasterId id="2147483686" r:id="rId1"/>
   </p:sldMasterIdLst>
   <p:notesMasterIdLst>
-    <p:notesMasterId r:id="rId15"/>
+    <p:notesMasterId r:id="rId18"/>
   </p:notesMasterIdLst>
   <p:sldIdLst>
     <p:sldId id="256" r:id="rId2"/>
     <p:sldId id="259" r:id="rId3"/>
     <p:sldId id="265" r:id="rId4"/>
-    <p:sldId id="261" r:id="rId5"/>
-    <p:sldId id="262" r:id="rId6"/>
-    <p:sldId id="263" r:id="rId7"/>
-    <p:sldId id="264" r:id="rId8"/>
-    <p:sldId id="260" r:id="rId9"/>
-    <p:sldId id="257" r:id="rId10"/>
-    <p:sldId id="267" r:id="rId11"/>
-    <p:sldId id="266" r:id="rId12"/>
-    <p:sldId id="268" r:id="rId13"/>
-    <p:sldId id="258" r:id="rId14"/>
+    <p:sldId id="270" r:id="rId5"/>
+    <p:sldId id="269" r:id="rId6"/>
+    <p:sldId id="271" r:id="rId7"/>
+    <p:sldId id="261" r:id="rId8"/>
+    <p:sldId id="262" r:id="rId9"/>
+    <p:sldId id="263" r:id="rId10"/>
+    <p:sldId id="264" r:id="rId11"/>
+    <p:sldId id="260" r:id="rId12"/>
+    <p:sldId id="257" r:id="rId13"/>
+    <p:sldId id="267" r:id="rId14"/>
+    <p:sldId id="266" r:id="rId15"/>
+    <p:sldId id="268" r:id="rId16"/>
+    <p:sldId id="258" r:id="rId17"/>
   </p:sldIdLst>
   <p:sldSz cx="12192000" cy="6858000"/>
   <p:notesSz cx="6858000" cy="9144000"/>
@@ -631,7 +634,7 @@
           <a:p>
             <a:fld id="{1730CD5D-24B7-6341-B9CF-6E4EB9A46052}" type="slidenum">
               <a:rPr lang="en-US" smtClean="0"/>
-              <a:t>5</a:t>
+              <a:t>8</a:t>
             </a:fld>
             <a:endParaRPr lang="en-US"/>
           </a:p>
@@ -4899,7 +4902,7 @@
           <p:cNvPr id="2" name="Title 1">
             <a:extLst>
               <a:ext uri="{FF2B5EF4-FFF2-40B4-BE49-F238E27FC236}">
-                <a16:creationId xmlns:a16="http://schemas.microsoft.com/office/drawing/2014/main" id="{6F6E96EE-83BC-BB43-9AF3-0D6B6CBFAE87}"/>
+                <a16:creationId xmlns:a16="http://schemas.microsoft.com/office/drawing/2014/main" id="{D34F24D6-8A10-774E-AE11-9CF63D3FAEBD}"/>
               </a:ext>
             </a:extLst>
           </p:cNvPr>
@@ -4917,43 +4920,47 @@
           <a:p>
             <a:r>
               <a:rPr lang="en-US" dirty="0"/>
-              <a:t>Limitations</a:t>
-            </a:r>
-          </a:p>
-        </p:txBody>
-      </p:sp>
-      <p:sp>
-        <p:nvSpPr>
-          <p:cNvPr id="3" name="Content Placeholder 2">
-            <a:extLst>
-              <a:ext uri="{FF2B5EF4-FFF2-40B4-BE49-F238E27FC236}">
-                <a16:creationId xmlns:a16="http://schemas.microsoft.com/office/drawing/2014/main" id="{35725B03-276A-9043-932F-2E2E435475CF}"/>
-              </a:ext>
-            </a:extLst>
-          </p:cNvPr>
-          <p:cNvSpPr>
-            <a:spLocks noGrp="1"/>
-          </p:cNvSpPr>
+              <a:t>Top and Bottom 5 By Noise Pollution</a:t>
+            </a:r>
+          </a:p>
+        </p:txBody>
+      </p:sp>
+      <p:pic>
+        <p:nvPicPr>
+          <p:cNvPr id="7" name="Content Placeholder 6">
+            <a:extLst>
+              <a:ext uri="{FF2B5EF4-FFF2-40B4-BE49-F238E27FC236}">
+                <a16:creationId xmlns:a16="http://schemas.microsoft.com/office/drawing/2014/main" id="{6F777144-12B6-E54A-B95A-0EB6A3B083E7}"/>
+              </a:ext>
+            </a:extLst>
+          </p:cNvPr>
+          <p:cNvPicPr>
+            <a:picLocks noGrp="1" noChangeAspect="1"/>
+          </p:cNvPicPr>
           <p:nvPr>
             <p:ph idx="1"/>
           </p:nvPr>
-        </p:nvSpPr>
-        <p:spPr/>
-        <p:txBody>
-          <a:bodyPr/>
-          <a:lstStyle/>
-          <a:p>
-            <a:r>
-              <a:rPr lang="en-US" dirty="0"/>
-              <a:t>Zip codes do not correspond to neighborhoods, one zip code can belong to 2 neighborhoods. I used a mapping that is used by real estate professionals, but it is not exact.</a:t>
-            </a:r>
-          </a:p>
-        </p:txBody>
-      </p:sp>
+        </p:nvPicPr>
+        <p:blipFill>
+          <a:blip r:embed="rId2"/>
+          <a:stretch>
+            <a:fillRect/>
+          </a:stretch>
+        </p:blipFill>
+        <p:spPr>
+          <a:xfrm>
+            <a:off x="671513" y="1878345"/>
+            <a:ext cx="10101261" cy="4636755"/>
+          </a:xfrm>
+          <a:prstGeom prst="rect">
+            <a:avLst/>
+          </a:prstGeom>
+        </p:spPr>
+      </p:pic>
     </p:spTree>
     <p:extLst>
       <p:ext uri="{BB962C8B-B14F-4D97-AF65-F5344CB8AC3E}">
-        <p14:creationId xmlns:p14="http://schemas.microsoft.com/office/powerpoint/2010/main" val="821573542"/>
+        <p14:creationId xmlns:p14="http://schemas.microsoft.com/office/powerpoint/2010/main" val="705211387"/>
       </p:ext>
     </p:extLst>
   </p:cSld>
@@ -4985,6 +4992,355 @@
           <p:cNvPr id="2" name="Title 1">
             <a:extLst>
               <a:ext uri="{FF2B5EF4-FFF2-40B4-BE49-F238E27FC236}">
+                <a16:creationId xmlns:a16="http://schemas.microsoft.com/office/drawing/2014/main" id="{2F2BA9B1-A85B-E14F-B9BC-06DEFE65A80E}"/>
+              </a:ext>
+            </a:extLst>
+          </p:cNvPr>
+          <p:cNvSpPr>
+            <a:spLocks noGrp="1"/>
+          </p:cNvSpPr>
+          <p:nvPr>
+            <p:ph type="title"/>
+          </p:nvPr>
+        </p:nvSpPr>
+        <p:spPr/>
+        <p:txBody>
+          <a:bodyPr/>
+          <a:lstStyle/>
+          <a:p>
+            <a:r>
+              <a:rPr lang="en-US" dirty="0"/>
+              <a:t>Conclusions</a:t>
+            </a:r>
+          </a:p>
+        </p:txBody>
+      </p:sp>
+      <p:sp>
+        <p:nvSpPr>
+          <p:cNvPr id="3" name="Content Placeholder 2">
+            <a:extLst>
+              <a:ext uri="{FF2B5EF4-FFF2-40B4-BE49-F238E27FC236}">
+                <a16:creationId xmlns:a16="http://schemas.microsoft.com/office/drawing/2014/main" id="{A40618CF-0621-6343-9D40-9584B8A09BE9}"/>
+              </a:ext>
+            </a:extLst>
+          </p:cNvPr>
+          <p:cNvSpPr>
+            <a:spLocks noGrp="1"/>
+          </p:cNvSpPr>
+          <p:nvPr>
+            <p:ph idx="1"/>
+          </p:nvPr>
+        </p:nvSpPr>
+        <p:spPr/>
+        <p:txBody>
+          <a:bodyPr>
+            <a:normAutofit fontScale="77500" lnSpcReduction="20000"/>
+          </a:bodyPr>
+          <a:lstStyle/>
+          <a:p>
+            <a:r>
+              <a:rPr lang="en-US" dirty="0"/>
+              <a:t>Not all cheap neighborhoods are noise free. </a:t>
+            </a:r>
+          </a:p>
+          <a:p>
+            <a:r>
+              <a:rPr lang="en-US" dirty="0"/>
+              <a:t>Some of the noisiest neighborhoods are the most expensive.</a:t>
+            </a:r>
+          </a:p>
+          <a:p>
+            <a:r>
+              <a:rPr lang="en-US" dirty="0"/>
+              <a:t>I looked at the bottom 5 in both sets and identified 'Borough Park’ and 'Bath Beach/Bensonhurst’ as very affordable and very low noise level neighborhoods. If I were looking to rent, with noise pollution being a key factor in rental location, I would definitely further researched “Borough Park’ as an area closest to Manhattan. </a:t>
+            </a:r>
+          </a:p>
+          <a:p>
+            <a:r>
+              <a:rPr lang="en-US" dirty="0"/>
+              <a:t>If selection is increased to the bottom 10, the following new names appear: 'Canarsie', '</a:t>
+            </a:r>
+            <a:r>
+              <a:rPr lang="en-US" dirty="0" err="1"/>
+              <a:t>Vanderveer</a:t>
+            </a:r>
+            <a:r>
+              <a:rPr lang="en-US" dirty="0"/>
+              <a:t>/Flatbush', 'Gravesend/</a:t>
+            </a:r>
+            <a:r>
+              <a:rPr lang="en-US" dirty="0" err="1"/>
+              <a:t>Homecrest</a:t>
+            </a:r>
+            <a:r>
+              <a:rPr lang="en-US" dirty="0"/>
+              <a:t>’. </a:t>
+            </a:r>
+          </a:p>
+          <a:p>
+            <a:r>
+              <a:rPr lang="en-US" dirty="0"/>
+              <a:t>I did not find any correlation between level of noise and rent prices in this research.</a:t>
+            </a:r>
+          </a:p>
+          <a:p>
+            <a:r>
+              <a:rPr lang="en-US" dirty="0"/>
+              <a:t>Noise pollution in NYC is an issue which varies from neighborhood to neighborhood and needs to be further researched.</a:t>
+            </a:r>
+          </a:p>
+        </p:txBody>
+      </p:sp>
+    </p:spTree>
+    <p:extLst>
+      <p:ext uri="{BB962C8B-B14F-4D97-AF65-F5344CB8AC3E}">
+        <p14:creationId xmlns:p14="http://schemas.microsoft.com/office/powerpoint/2010/main" val="2403573745"/>
+      </p:ext>
+    </p:extLst>
+  </p:cSld>
+  <p:clrMapOvr>
+    <a:masterClrMapping/>
+  </p:clrMapOvr>
+</p:sld>
+</file>
+
+<file path=ppt/slides/slide12.xml><?xml version="1.0" encoding="utf-8"?>
+<p:sld xmlns:a="http://schemas.openxmlformats.org/drawingml/2006/main" xmlns:r="http://schemas.openxmlformats.org/officeDocument/2006/relationships" xmlns:p="http://schemas.openxmlformats.org/presentationml/2006/main">
+  <p:cSld>
+    <p:spTree>
+      <p:nvGrpSpPr>
+        <p:cNvPr id="1" name=""/>
+        <p:cNvGrpSpPr/>
+        <p:nvPr/>
+      </p:nvGrpSpPr>
+      <p:grpSpPr>
+        <a:xfrm>
+          <a:off x="0" y="0"/>
+          <a:ext cx="0" cy="0"/>
+          <a:chOff x="0" y="0"/>
+          <a:chExt cx="0" cy="0"/>
+        </a:xfrm>
+      </p:grpSpPr>
+      <p:sp>
+        <p:nvSpPr>
+          <p:cNvPr id="2" name="Title 1">
+            <a:extLst>
+              <a:ext uri="{FF2B5EF4-FFF2-40B4-BE49-F238E27FC236}">
+                <a16:creationId xmlns:a16="http://schemas.microsoft.com/office/drawing/2014/main" id="{8D90C3CF-3B46-4746-8C39-1C5696AB4FB6}"/>
+              </a:ext>
+            </a:extLst>
+          </p:cNvPr>
+          <p:cNvSpPr>
+            <a:spLocks noGrp="1"/>
+          </p:cNvSpPr>
+          <p:nvPr>
+            <p:ph type="title"/>
+          </p:nvPr>
+        </p:nvSpPr>
+        <p:spPr/>
+        <p:txBody>
+          <a:bodyPr/>
+          <a:lstStyle/>
+          <a:p>
+            <a:r>
+              <a:rPr lang="en-US" dirty="0"/>
+              <a:t>Future research</a:t>
+            </a:r>
+          </a:p>
+        </p:txBody>
+      </p:sp>
+      <p:sp>
+        <p:nvSpPr>
+          <p:cNvPr id="3" name="Content Placeholder 2">
+            <a:extLst>
+              <a:ext uri="{FF2B5EF4-FFF2-40B4-BE49-F238E27FC236}">
+                <a16:creationId xmlns:a16="http://schemas.microsoft.com/office/drawing/2014/main" id="{9E00F9F2-2FD5-D04F-B558-C82D29C7211A}"/>
+              </a:ext>
+            </a:extLst>
+          </p:cNvPr>
+          <p:cNvSpPr>
+            <a:spLocks noGrp="1"/>
+          </p:cNvSpPr>
+          <p:nvPr>
+            <p:ph idx="1"/>
+          </p:nvPr>
+        </p:nvSpPr>
+        <p:spPr/>
+        <p:txBody>
+          <a:bodyPr>
+            <a:normAutofit lnSpcReduction="10000"/>
+          </a:bodyPr>
+          <a:lstStyle/>
+          <a:p>
+            <a:r>
+              <a:rPr lang="en-US" dirty="0"/>
+              <a:t>Analyze more neighborhoods in other boroughs. </a:t>
+            </a:r>
+          </a:p>
+          <a:p>
+            <a:r>
+              <a:rPr lang="en-US" dirty="0"/>
+              <a:t>Can we find correlations with other types of complaints?</a:t>
+            </a:r>
+          </a:p>
+          <a:p>
+            <a:r>
+              <a:rPr lang="en-US" dirty="0"/>
+              <a:t>Add interactive map where users can select a type of complaint and the map will show color coded </a:t>
+            </a:r>
+            <a:r>
+              <a:rPr lang="en-US" dirty="0" err="1"/>
+              <a:t>inofrmation</a:t>
+            </a:r>
+            <a:r>
+              <a:rPr lang="en-US" dirty="0"/>
+              <a:t>.</a:t>
+            </a:r>
+          </a:p>
+          <a:p>
+            <a:r>
+              <a:rPr lang="en-US" dirty="0"/>
+              <a:t>I only had time to do this analysis for Noise related issues, but would be interesting to see other complaints.</a:t>
+            </a:r>
+          </a:p>
+          <a:p>
+            <a:r>
+              <a:rPr lang="en-US" dirty="0"/>
+              <a:t>Identify the source of noise by correlation with business, entertainment, restaurants and bars.</a:t>
+            </a:r>
+          </a:p>
+          <a:p>
+            <a:endParaRPr lang="en-US" dirty="0"/>
+          </a:p>
+          <a:p>
+            <a:endParaRPr lang="en-US" dirty="0"/>
+          </a:p>
+          <a:p>
+            <a:endParaRPr lang="en-US" dirty="0"/>
+          </a:p>
+        </p:txBody>
+      </p:sp>
+    </p:spTree>
+    <p:extLst>
+      <p:ext uri="{BB962C8B-B14F-4D97-AF65-F5344CB8AC3E}">
+        <p14:creationId xmlns:p14="http://schemas.microsoft.com/office/powerpoint/2010/main" val="81433375"/>
+      </p:ext>
+    </p:extLst>
+  </p:cSld>
+  <p:clrMapOvr>
+    <a:masterClrMapping/>
+  </p:clrMapOvr>
+</p:sld>
+</file>
+
+<file path=ppt/slides/slide13.xml><?xml version="1.0" encoding="utf-8"?>
+<p:sld xmlns:a="http://schemas.openxmlformats.org/drawingml/2006/main" xmlns:r="http://schemas.openxmlformats.org/officeDocument/2006/relationships" xmlns:p="http://schemas.openxmlformats.org/presentationml/2006/main">
+  <p:cSld>
+    <p:spTree>
+      <p:nvGrpSpPr>
+        <p:cNvPr id="1" name=""/>
+        <p:cNvGrpSpPr/>
+        <p:nvPr/>
+      </p:nvGrpSpPr>
+      <p:grpSpPr>
+        <a:xfrm>
+          <a:off x="0" y="0"/>
+          <a:ext cx="0" cy="0"/>
+          <a:chOff x="0" y="0"/>
+          <a:chExt cx="0" cy="0"/>
+        </a:xfrm>
+      </p:grpSpPr>
+      <p:sp>
+        <p:nvSpPr>
+          <p:cNvPr id="2" name="Title 1">
+            <a:extLst>
+              <a:ext uri="{FF2B5EF4-FFF2-40B4-BE49-F238E27FC236}">
+                <a16:creationId xmlns:a16="http://schemas.microsoft.com/office/drawing/2014/main" id="{6F6E96EE-83BC-BB43-9AF3-0D6B6CBFAE87}"/>
+              </a:ext>
+            </a:extLst>
+          </p:cNvPr>
+          <p:cNvSpPr>
+            <a:spLocks noGrp="1"/>
+          </p:cNvSpPr>
+          <p:nvPr>
+            <p:ph type="title"/>
+          </p:nvPr>
+        </p:nvSpPr>
+        <p:spPr/>
+        <p:txBody>
+          <a:bodyPr/>
+          <a:lstStyle/>
+          <a:p>
+            <a:r>
+              <a:rPr lang="en-US" dirty="0"/>
+              <a:t>Limitations</a:t>
+            </a:r>
+          </a:p>
+        </p:txBody>
+      </p:sp>
+      <p:sp>
+        <p:nvSpPr>
+          <p:cNvPr id="3" name="Content Placeholder 2">
+            <a:extLst>
+              <a:ext uri="{FF2B5EF4-FFF2-40B4-BE49-F238E27FC236}">
+                <a16:creationId xmlns:a16="http://schemas.microsoft.com/office/drawing/2014/main" id="{35725B03-276A-9043-932F-2E2E435475CF}"/>
+              </a:ext>
+            </a:extLst>
+          </p:cNvPr>
+          <p:cNvSpPr>
+            <a:spLocks noGrp="1"/>
+          </p:cNvSpPr>
+          <p:nvPr>
+            <p:ph idx="1"/>
+          </p:nvPr>
+        </p:nvSpPr>
+        <p:spPr/>
+        <p:txBody>
+          <a:bodyPr/>
+          <a:lstStyle/>
+          <a:p>
+            <a:r>
+              <a:rPr lang="en-US" dirty="0"/>
+              <a:t>Zip codes do not correspond to neighborhoods, one zip code can belong to 2 neighborhoods. I found a mapping that is used by real estate professionals, but it is not exact.</a:t>
+            </a:r>
+          </a:p>
+        </p:txBody>
+      </p:sp>
+    </p:spTree>
+    <p:extLst>
+      <p:ext uri="{BB962C8B-B14F-4D97-AF65-F5344CB8AC3E}">
+        <p14:creationId xmlns:p14="http://schemas.microsoft.com/office/powerpoint/2010/main" val="821573542"/>
+      </p:ext>
+    </p:extLst>
+  </p:cSld>
+  <p:clrMapOvr>
+    <a:masterClrMapping/>
+  </p:clrMapOvr>
+</p:sld>
+</file>
+
+<file path=ppt/slides/slide14.xml><?xml version="1.0" encoding="utf-8"?>
+<p:sld xmlns:a="http://schemas.openxmlformats.org/drawingml/2006/main" xmlns:r="http://schemas.openxmlformats.org/officeDocument/2006/relationships" xmlns:p="http://schemas.openxmlformats.org/presentationml/2006/main">
+  <p:cSld>
+    <p:spTree>
+      <p:nvGrpSpPr>
+        <p:cNvPr id="1" name=""/>
+        <p:cNvGrpSpPr/>
+        <p:nvPr/>
+      </p:nvGrpSpPr>
+      <p:grpSpPr>
+        <a:xfrm>
+          <a:off x="0" y="0"/>
+          <a:ext cx="0" cy="0"/>
+          <a:chOff x="0" y="0"/>
+          <a:chExt cx="0" cy="0"/>
+        </a:xfrm>
+      </p:grpSpPr>
+      <p:sp>
+        <p:nvSpPr>
+          <p:cNvPr id="2" name="Title 1">
+            <a:extLst>
+              <a:ext uri="{FF2B5EF4-FFF2-40B4-BE49-F238E27FC236}">
                 <a16:creationId xmlns:a16="http://schemas.microsoft.com/office/drawing/2014/main" id="{166FC4BF-7A14-BC40-B66D-02397CB97ED4}"/>
               </a:ext>
             </a:extLst>
@@ -5093,7 +5449,7 @@
 </p:sld>
 </file>
 
-<file path=ppt/slides/slide12.xml><?xml version="1.0" encoding="utf-8"?>
+<file path=ppt/slides/slide15.xml><?xml version="1.0" encoding="utf-8"?>
 <p:sld xmlns:a="http://schemas.openxmlformats.org/drawingml/2006/main" xmlns:r="http://schemas.openxmlformats.org/officeDocument/2006/relationships" xmlns:p="http://schemas.openxmlformats.org/presentationml/2006/main">
   <p:cSld>
     <p:spTree>
@@ -5180,7 +5536,7 @@
 </p:sld>
 </file>
 
-<file path=ppt/slides/slide13.xml><?xml version="1.0" encoding="utf-8"?>
+<file path=ppt/slides/slide16.xml><?xml version="1.0" encoding="utf-8"?>
 <p:sld xmlns:a="http://schemas.openxmlformats.org/drawingml/2006/main" xmlns:r="http://schemas.openxmlformats.org/officeDocument/2006/relationships" xmlns:p="http://schemas.openxmlformats.org/presentationml/2006/main">
   <p:cSld>
     <p:spTree>
@@ -5504,7 +5860,7 @@
             </a:r>
             <a:r>
               <a:rPr lang="en-US" dirty="0"/>
-              <a:t>, over 200 different categories in total. </a:t>
+              <a:t>, 220 different categories in total. </a:t>
             </a:r>
           </a:p>
           <a:p>
@@ -5558,6 +5914,648 @@
           <p:cNvPr id="2" name="Title 1">
             <a:extLst>
               <a:ext uri="{FF2B5EF4-FFF2-40B4-BE49-F238E27FC236}">
+                <a16:creationId xmlns:a16="http://schemas.microsoft.com/office/drawing/2014/main" id="{B970F503-4650-4642-838E-06B98513C2FB}"/>
+              </a:ext>
+            </a:extLst>
+          </p:cNvPr>
+          <p:cNvSpPr>
+            <a:spLocks noGrp="1"/>
+          </p:cNvSpPr>
+          <p:nvPr>
+            <p:ph type="title"/>
+          </p:nvPr>
+        </p:nvSpPr>
+        <p:spPr/>
+        <p:txBody>
+          <a:bodyPr/>
+          <a:lstStyle/>
+          <a:p>
+            <a:r>
+              <a:rPr lang="en-US" dirty="0"/>
+              <a:t>Most common complaints in the city</a:t>
+            </a:r>
+          </a:p>
+        </p:txBody>
+      </p:sp>
+      <p:pic>
+        <p:nvPicPr>
+          <p:cNvPr id="4" name="Content Placeholder 3">
+            <a:extLst>
+              <a:ext uri="{FF2B5EF4-FFF2-40B4-BE49-F238E27FC236}">
+                <a16:creationId xmlns:a16="http://schemas.microsoft.com/office/drawing/2014/main" id="{304C68D2-D6BF-CD41-B8D5-D9E949A06D49}"/>
+              </a:ext>
+            </a:extLst>
+          </p:cNvPr>
+          <p:cNvPicPr>
+            <a:picLocks noGrp="1" noChangeAspect="1"/>
+          </p:cNvPicPr>
+          <p:nvPr>
+            <p:ph idx="1"/>
+          </p:nvPr>
+        </p:nvPicPr>
+        <p:blipFill>
+          <a:blip r:embed="rId2"/>
+          <a:stretch>
+            <a:fillRect/>
+          </a:stretch>
+        </p:blipFill>
+        <p:spPr>
+          <a:xfrm>
+            <a:off x="1053548" y="1816416"/>
+            <a:ext cx="9276700" cy="4027172"/>
+          </a:xfrm>
+          <a:prstGeom prst="rect">
+            <a:avLst/>
+          </a:prstGeom>
+        </p:spPr>
+      </p:pic>
+    </p:spTree>
+    <p:extLst>
+      <p:ext uri="{BB962C8B-B14F-4D97-AF65-F5344CB8AC3E}">
+        <p14:creationId xmlns:p14="http://schemas.microsoft.com/office/powerpoint/2010/main" val="677500706"/>
+      </p:ext>
+    </p:extLst>
+  </p:cSld>
+  <p:clrMapOvr>
+    <a:masterClrMapping/>
+  </p:clrMapOvr>
+</p:sld>
+</file>
+
+<file path=ppt/slides/slide5.xml><?xml version="1.0" encoding="utf-8"?>
+<p:sld xmlns:a="http://schemas.openxmlformats.org/drawingml/2006/main" xmlns:r="http://schemas.openxmlformats.org/officeDocument/2006/relationships" xmlns:p="http://schemas.openxmlformats.org/presentationml/2006/main">
+  <p:cSld>
+    <p:spTree>
+      <p:nvGrpSpPr>
+        <p:cNvPr id="1" name=""/>
+        <p:cNvGrpSpPr/>
+        <p:nvPr/>
+      </p:nvGrpSpPr>
+      <p:grpSpPr>
+        <a:xfrm>
+          <a:off x="0" y="0"/>
+          <a:ext cx="0" cy="0"/>
+          <a:chOff x="0" y="0"/>
+          <a:chExt cx="0" cy="0"/>
+        </a:xfrm>
+      </p:grpSpPr>
+      <p:sp>
+        <p:nvSpPr>
+          <p:cNvPr id="2" name="Title 1">
+            <a:extLst>
+              <a:ext uri="{FF2B5EF4-FFF2-40B4-BE49-F238E27FC236}">
+                <a16:creationId xmlns:a16="http://schemas.microsoft.com/office/drawing/2014/main" id="{2EF6E959-D97B-1445-8300-03722CF0D6AA}"/>
+              </a:ext>
+            </a:extLst>
+          </p:cNvPr>
+          <p:cNvSpPr>
+            <a:spLocks noGrp="1"/>
+          </p:cNvSpPr>
+          <p:nvPr>
+            <p:ph type="title"/>
+          </p:nvPr>
+        </p:nvSpPr>
+        <p:spPr/>
+        <p:txBody>
+          <a:bodyPr/>
+          <a:lstStyle/>
+          <a:p>
+            <a:r>
+              <a:rPr lang="en-US" dirty="0"/>
+              <a:t>Where all the noise is coming from?</a:t>
+            </a:r>
+          </a:p>
+        </p:txBody>
+      </p:sp>
+      <p:pic>
+        <p:nvPicPr>
+          <p:cNvPr id="4" name="Content Placeholder 3">
+            <a:extLst>
+              <a:ext uri="{FF2B5EF4-FFF2-40B4-BE49-F238E27FC236}">
+                <a16:creationId xmlns:a16="http://schemas.microsoft.com/office/drawing/2014/main" id="{53864033-8F10-474B-9849-A079837F4C5B}"/>
+              </a:ext>
+            </a:extLst>
+          </p:cNvPr>
+          <p:cNvPicPr>
+            <a:picLocks noGrp="1" noChangeAspect="1"/>
+          </p:cNvPicPr>
+          <p:nvPr>
+            <p:ph idx="1"/>
+          </p:nvPr>
+        </p:nvPicPr>
+        <p:blipFill>
+          <a:blip r:embed="rId2"/>
+          <a:stretch>
+            <a:fillRect/>
+          </a:stretch>
+        </p:blipFill>
+        <p:spPr>
+          <a:xfrm>
+            <a:off x="1889952" y="2095500"/>
+            <a:ext cx="7391334" cy="3748088"/>
+          </a:xfrm>
+          <a:prstGeom prst="rect">
+            <a:avLst/>
+          </a:prstGeom>
+        </p:spPr>
+      </p:pic>
+    </p:spTree>
+    <p:extLst>
+      <p:ext uri="{BB962C8B-B14F-4D97-AF65-F5344CB8AC3E}">
+        <p14:creationId xmlns:p14="http://schemas.microsoft.com/office/powerpoint/2010/main" val="2546239245"/>
+      </p:ext>
+    </p:extLst>
+  </p:cSld>
+  <p:clrMapOvr>
+    <a:masterClrMapping/>
+  </p:clrMapOvr>
+</p:sld>
+</file>
+
+<file path=ppt/slides/slide6.xml><?xml version="1.0" encoding="utf-8"?>
+<p:sld xmlns:a="http://schemas.openxmlformats.org/drawingml/2006/main" xmlns:r="http://schemas.openxmlformats.org/officeDocument/2006/relationships" xmlns:p="http://schemas.openxmlformats.org/presentationml/2006/main">
+  <p:cSld>
+    <p:bg>
+      <p:bgPr>
+        <a:solidFill>
+          <a:schemeClr val="bg1"/>
+        </a:solidFill>
+        <a:effectLst/>
+      </p:bgPr>
+    </p:bg>
+    <p:spTree>
+      <p:nvGrpSpPr>
+        <p:cNvPr id="1" name=""/>
+        <p:cNvGrpSpPr/>
+        <p:nvPr/>
+      </p:nvGrpSpPr>
+      <p:grpSpPr>
+        <a:xfrm>
+          <a:off x="0" y="0"/>
+          <a:ext cx="0" cy="0"/>
+          <a:chOff x="0" y="0"/>
+          <a:chExt cx="0" cy="0"/>
+        </a:xfrm>
+      </p:grpSpPr>
+      <p:sp>
+        <p:nvSpPr>
+          <p:cNvPr id="9" name="Rectangle 8">
+            <a:extLst>
+              <a:ext uri="{FF2B5EF4-FFF2-40B4-BE49-F238E27FC236}">
+                <a16:creationId xmlns:a16="http://schemas.microsoft.com/office/drawing/2014/main" id="{F194AEDE-F25F-43E6-A2C4-7FFF41074990}"/>
+              </a:ext>
+              <a:ext uri="{C183D7F6-B498-43B3-948B-1728B52AA6E4}">
+                <adec:decorative xmlns:adec="http://schemas.microsoft.com/office/drawing/2017/decorative" val="1"/>
+              </a:ext>
+            </a:extLst>
+          </p:cNvPr>
+          <p:cNvSpPr>
+            <a:spLocks noGrp="1" noRot="1" noChangeAspect="1" noMove="1" noResize="1" noEditPoints="1" noAdjustHandles="1" noChangeArrowheads="1" noChangeShapeType="1" noTextEdit="1"/>
+          </p:cNvSpPr>
+          <p:nvPr>
+            <p:extLst>
+              <p:ext uri="{386F3935-93C4-4BCD-93E2-E3B085C9AB24}">
+                <p16:designElem xmlns:p16="http://schemas.microsoft.com/office/powerpoint/2015/main" val="1"/>
+              </p:ext>
+            </p:extLst>
+          </p:nvPr>
+        </p:nvSpPr>
+        <p:spPr>
+          <a:xfrm>
+            <a:off x="367744" y="334928"/>
+            <a:ext cx="11456511" cy="6188146"/>
+          </a:xfrm>
+          <a:prstGeom prst="rect">
+            <a:avLst/>
+          </a:prstGeom>
+          <a:noFill/>
+          <a:ln>
+            <a:solidFill>
+              <a:schemeClr val="tx1"/>
+            </a:solidFill>
+          </a:ln>
+        </p:spPr>
+        <p:style>
+          <a:lnRef idx="2">
+            <a:schemeClr val="accent1">
+              <a:shade val="50000"/>
+            </a:schemeClr>
+          </a:lnRef>
+          <a:fillRef idx="1">
+            <a:schemeClr val="accent1"/>
+          </a:fillRef>
+          <a:effectRef idx="0">
+            <a:schemeClr val="accent1"/>
+          </a:effectRef>
+          <a:fontRef idx="minor">
+            <a:schemeClr val="lt1"/>
+          </a:fontRef>
+        </p:style>
+        <p:txBody>
+          <a:bodyPr rtlCol="0" anchor="ctr"/>
+          <a:lstStyle/>
+          <a:p>
+            <a:pPr algn="ctr"/>
+            <a:endParaRPr lang="en-US"/>
+          </a:p>
+        </p:txBody>
+      </p:sp>
+      <p:cxnSp>
+        <p:nvCxnSpPr>
+          <p:cNvPr id="23" name="Straight Connector 10">
+            <a:extLst>
+              <a:ext uri="{FF2B5EF4-FFF2-40B4-BE49-F238E27FC236}">
+                <a16:creationId xmlns:a16="http://schemas.microsoft.com/office/drawing/2014/main" id="{4C793C08-EF4C-422B-A728-6C717C47DF6F}"/>
+              </a:ext>
+              <a:ext uri="{C183D7F6-B498-43B3-948B-1728B52AA6E4}">
+                <adec:decorative xmlns:adec="http://schemas.microsoft.com/office/drawing/2017/decorative" val="1"/>
+              </a:ext>
+            </a:extLst>
+          </p:cNvPr>
+          <p:cNvCxnSpPr>
+            <a:cxnSpLocks noGrp="1" noRot="1" noChangeAspect="1" noMove="1" noResize="1" noEditPoints="1" noAdjustHandles="1" noChangeArrowheads="1" noChangeShapeType="1"/>
+          </p:cNvCxnSpPr>
+          <p:nvPr>
+            <p:extLst>
+              <p:ext uri="{386F3935-93C4-4BCD-93E2-E3B085C9AB24}">
+                <p16:designElem xmlns:p16="http://schemas.microsoft.com/office/powerpoint/2015/main" val="1"/>
+              </p:ext>
+            </p:extLst>
+          </p:nvPr>
+        </p:nvCxnSpPr>
+        <p:spPr>
+          <a:xfrm>
+            <a:off x="10748698" y="334928"/>
+            <a:ext cx="0" cy="6188146"/>
+          </a:xfrm>
+          <a:prstGeom prst="line">
+            <a:avLst/>
+          </a:prstGeom>
+          <a:ln w="12700">
+            <a:solidFill>
+              <a:schemeClr val="tx1"/>
+            </a:solidFill>
+          </a:ln>
+        </p:spPr>
+        <p:style>
+          <a:lnRef idx="1">
+            <a:schemeClr val="accent1"/>
+          </a:lnRef>
+          <a:fillRef idx="0">
+            <a:schemeClr val="accent1"/>
+          </a:fillRef>
+          <a:effectRef idx="0">
+            <a:schemeClr val="accent1"/>
+          </a:effectRef>
+          <a:fontRef idx="minor">
+            <a:schemeClr val="tx1"/>
+          </a:fontRef>
+        </p:style>
+      </p:cxnSp>
+      <p:cxnSp>
+        <p:nvCxnSpPr>
+          <p:cNvPr id="24" name="Straight Connector 12">
+            <a:extLst>
+              <a:ext uri="{FF2B5EF4-FFF2-40B4-BE49-F238E27FC236}">
+                <a16:creationId xmlns:a16="http://schemas.microsoft.com/office/drawing/2014/main" id="{FE825BC6-56A8-46DE-8037-A9A577624B0D}"/>
+              </a:ext>
+              <a:ext uri="{C183D7F6-B498-43B3-948B-1728B52AA6E4}">
+                <adec:decorative xmlns:adec="http://schemas.microsoft.com/office/drawing/2017/decorative" val="1"/>
+              </a:ext>
+            </a:extLst>
+          </p:cNvPr>
+          <p:cNvCxnSpPr>
+            <a:cxnSpLocks noGrp="1" noRot="1" noChangeAspect="1" noMove="1" noResize="1" noEditPoints="1" noAdjustHandles="1" noChangeArrowheads="1" noChangeShapeType="1"/>
+          </p:cNvCxnSpPr>
+          <p:nvPr>
+            <p:extLst>
+              <p:ext uri="{386F3935-93C4-4BCD-93E2-E3B085C9AB24}">
+                <p16:designElem xmlns:p16="http://schemas.microsoft.com/office/powerpoint/2015/main" val="1"/>
+              </p:ext>
+            </p:extLst>
+          </p:nvPr>
+        </p:nvCxnSpPr>
+        <p:spPr>
+          <a:xfrm>
+            <a:off x="373060" y="6047437"/>
+            <a:ext cx="10375638" cy="0"/>
+          </a:xfrm>
+          <a:prstGeom prst="line">
+            <a:avLst/>
+          </a:prstGeom>
+          <a:ln w="12700">
+            <a:solidFill>
+              <a:schemeClr val="tx1"/>
+            </a:solidFill>
+          </a:ln>
+        </p:spPr>
+        <p:style>
+          <a:lnRef idx="1">
+            <a:schemeClr val="accent1"/>
+          </a:lnRef>
+          <a:fillRef idx="0">
+            <a:schemeClr val="accent1"/>
+          </a:fillRef>
+          <a:effectRef idx="0">
+            <a:schemeClr val="accent1"/>
+          </a:effectRef>
+          <a:fontRef idx="minor">
+            <a:schemeClr val="tx1"/>
+          </a:fontRef>
+        </p:style>
+      </p:cxnSp>
+      <p:sp useBgFill="1">
+        <p:nvSpPr>
+          <p:cNvPr id="25" name="Background Fill">
+            <a:extLst>
+              <a:ext uri="{FF2B5EF4-FFF2-40B4-BE49-F238E27FC236}">
+                <a16:creationId xmlns:a16="http://schemas.microsoft.com/office/drawing/2014/main" id="{68CA250C-CF5A-4736-9249-D6111F7C5545}"/>
+              </a:ext>
+              <a:ext uri="{C183D7F6-B498-43B3-948B-1728B52AA6E4}">
+                <adec:decorative xmlns:adec="http://schemas.microsoft.com/office/drawing/2017/decorative" val="1"/>
+              </a:ext>
+            </a:extLst>
+          </p:cNvPr>
+          <p:cNvSpPr>
+            <a:spLocks noGrp="1" noRot="1" noChangeAspect="1" noMove="1" noResize="1" noEditPoints="1" noAdjustHandles="1" noChangeArrowheads="1" noChangeShapeType="1" noTextEdit="1"/>
+          </p:cNvSpPr>
+          <p:nvPr>
+            <p:extLst>
+              <p:ext uri="{386F3935-93C4-4BCD-93E2-E3B085C9AB24}">
+                <p16:designElem xmlns:p16="http://schemas.microsoft.com/office/powerpoint/2015/main" val="1"/>
+              </p:ext>
+            </p:extLst>
+          </p:nvPr>
+        </p:nvSpPr>
+        <p:spPr>
+          <a:xfrm>
+            <a:off x="0" y="0"/>
+            <a:ext cx="12188952" cy="6858000"/>
+          </a:xfrm>
+          <a:prstGeom prst="rect">
+            <a:avLst/>
+          </a:prstGeom>
+          <a:ln>
+            <a:noFill/>
+          </a:ln>
+        </p:spPr>
+        <p:style>
+          <a:lnRef idx="2">
+            <a:schemeClr val="accent1">
+              <a:shade val="50000"/>
+            </a:schemeClr>
+          </a:lnRef>
+          <a:fillRef idx="1">
+            <a:schemeClr val="accent1"/>
+          </a:fillRef>
+          <a:effectRef idx="0">
+            <a:schemeClr val="accent1"/>
+          </a:effectRef>
+          <a:fontRef idx="minor">
+            <a:schemeClr val="lt1"/>
+          </a:fontRef>
+        </p:style>
+        <p:txBody>
+          <a:bodyPr rtlCol="0" anchor="ctr"/>
+          <a:lstStyle/>
+          <a:p>
+            <a:pPr algn="ctr"/>
+            <a:endParaRPr lang="en-US"/>
+          </a:p>
+        </p:txBody>
+      </p:sp>
+      <p:sp>
+        <p:nvSpPr>
+          <p:cNvPr id="26" name="Main Frame">
+            <a:extLst>
+              <a:ext uri="{FF2B5EF4-FFF2-40B4-BE49-F238E27FC236}">
+                <a16:creationId xmlns:a16="http://schemas.microsoft.com/office/drawing/2014/main" id="{F82D9B81-57D7-4F0C-AB92-6E390E4E1DD3}"/>
+              </a:ext>
+              <a:ext uri="{C183D7F6-B498-43B3-948B-1728B52AA6E4}">
+                <adec:decorative xmlns:adec="http://schemas.microsoft.com/office/drawing/2017/decorative" val="1"/>
+              </a:ext>
+            </a:extLst>
+          </p:cNvPr>
+          <p:cNvSpPr>
+            <a:spLocks noGrp="1" noRot="1" noChangeAspect="1" noMove="1" noResize="1" noEditPoints="1" noAdjustHandles="1" noChangeArrowheads="1" noChangeShapeType="1" noTextEdit="1"/>
+          </p:cNvSpPr>
+          <p:nvPr>
+            <p:extLst>
+              <p:ext uri="{386F3935-93C4-4BCD-93E2-E3B085C9AB24}">
+                <p16:designElem xmlns:p16="http://schemas.microsoft.com/office/powerpoint/2015/main" val="1"/>
+              </p:ext>
+            </p:extLst>
+          </p:nvPr>
+        </p:nvSpPr>
+        <p:spPr>
+          <a:xfrm>
+            <a:off x="367744" y="334928"/>
+            <a:ext cx="11456511" cy="6188146"/>
+          </a:xfrm>
+          <a:prstGeom prst="rect">
+            <a:avLst/>
+          </a:prstGeom>
+          <a:noFill/>
+          <a:ln>
+            <a:solidFill>
+              <a:schemeClr val="tx1"/>
+            </a:solidFill>
+          </a:ln>
+        </p:spPr>
+        <p:style>
+          <a:lnRef idx="2">
+            <a:schemeClr val="accent1">
+              <a:shade val="50000"/>
+            </a:schemeClr>
+          </a:lnRef>
+          <a:fillRef idx="1">
+            <a:schemeClr val="accent1"/>
+          </a:fillRef>
+          <a:effectRef idx="0">
+            <a:schemeClr val="accent1"/>
+          </a:effectRef>
+          <a:fontRef idx="minor">
+            <a:schemeClr val="lt1"/>
+          </a:fontRef>
+        </p:style>
+        <p:txBody>
+          <a:bodyPr rtlCol="0" anchor="ctr"/>
+          <a:lstStyle/>
+          <a:p>
+            <a:pPr algn="ctr"/>
+            <a:endParaRPr lang="en-US"/>
+          </a:p>
+        </p:txBody>
+      </p:sp>
+      <p:cxnSp>
+        <p:nvCxnSpPr>
+          <p:cNvPr id="27" name="Main Horizontal Connector">
+            <a:extLst>
+              <a:ext uri="{FF2B5EF4-FFF2-40B4-BE49-F238E27FC236}">
+                <a16:creationId xmlns:a16="http://schemas.microsoft.com/office/drawing/2014/main" id="{AE3D1161-F2DF-43A9-8376-3DB1403155B7}"/>
+              </a:ext>
+              <a:ext uri="{C183D7F6-B498-43B3-948B-1728B52AA6E4}">
+                <adec:decorative xmlns:adec="http://schemas.microsoft.com/office/drawing/2017/decorative" val="1"/>
+              </a:ext>
+            </a:extLst>
+          </p:cNvPr>
+          <p:cNvCxnSpPr>
+            <a:cxnSpLocks noGrp="1" noRot="1" noChangeAspect="1" noMove="1" noResize="1" noEditPoints="1" noAdjustHandles="1" noChangeArrowheads="1" noChangeShapeType="1"/>
+          </p:cNvCxnSpPr>
+          <p:nvPr>
+            <p:extLst>
+              <p:ext uri="{386F3935-93C4-4BCD-93E2-E3B085C9AB24}">
+                <p16:designElem xmlns:p16="http://schemas.microsoft.com/office/powerpoint/2015/main" val="1"/>
+              </p:ext>
+            </p:extLst>
+          </p:nvPr>
+        </p:nvCxnSpPr>
+        <p:spPr>
+          <a:xfrm>
+            <a:off x="373060" y="6047437"/>
+            <a:ext cx="10375638" cy="0"/>
+          </a:xfrm>
+          <a:prstGeom prst="line">
+            <a:avLst/>
+          </a:prstGeom>
+          <a:ln w="12700">
+            <a:solidFill>
+              <a:schemeClr val="tx1"/>
+            </a:solidFill>
+          </a:ln>
+        </p:spPr>
+        <p:style>
+          <a:lnRef idx="1">
+            <a:schemeClr val="accent1"/>
+          </a:lnRef>
+          <a:fillRef idx="0">
+            <a:schemeClr val="accent1"/>
+          </a:fillRef>
+          <a:effectRef idx="0">
+            <a:schemeClr val="accent1"/>
+          </a:effectRef>
+          <a:fontRef idx="minor">
+            <a:schemeClr val="tx1"/>
+          </a:fontRef>
+        </p:style>
+      </p:cxnSp>
+      <p:cxnSp>
+        <p:nvCxnSpPr>
+          <p:cNvPr id="28" name="Main Vertical Connector">
+            <a:extLst>
+              <a:ext uri="{FF2B5EF4-FFF2-40B4-BE49-F238E27FC236}">
+                <a16:creationId xmlns:a16="http://schemas.microsoft.com/office/drawing/2014/main" id="{FF393DD8-555D-4D86-9600-299145E032F9}"/>
+              </a:ext>
+              <a:ext uri="{C183D7F6-B498-43B3-948B-1728B52AA6E4}">
+                <adec:decorative xmlns:adec="http://schemas.microsoft.com/office/drawing/2017/decorative" val="1"/>
+              </a:ext>
+            </a:extLst>
+          </p:cNvPr>
+          <p:cNvCxnSpPr>
+            <a:cxnSpLocks noGrp="1" noRot="1" noChangeAspect="1" noMove="1" noResize="1" noEditPoints="1" noAdjustHandles="1" noChangeArrowheads="1" noChangeShapeType="1"/>
+          </p:cNvCxnSpPr>
+          <p:nvPr>
+            <p:extLst>
+              <p:ext uri="{386F3935-93C4-4BCD-93E2-E3B085C9AB24}">
+                <p16:designElem xmlns:p16="http://schemas.microsoft.com/office/powerpoint/2015/main" val="1"/>
+              </p:ext>
+            </p:extLst>
+          </p:nvPr>
+        </p:nvCxnSpPr>
+        <p:spPr>
+          <a:xfrm>
+            <a:off x="10748698" y="334928"/>
+            <a:ext cx="0" cy="6188146"/>
+          </a:xfrm>
+          <a:prstGeom prst="line">
+            <a:avLst/>
+          </a:prstGeom>
+          <a:ln w="12700">
+            <a:solidFill>
+              <a:schemeClr val="tx1"/>
+            </a:solidFill>
+          </a:ln>
+        </p:spPr>
+        <p:style>
+          <a:lnRef idx="1">
+            <a:schemeClr val="accent1"/>
+          </a:lnRef>
+          <a:fillRef idx="0">
+            <a:schemeClr val="accent1"/>
+          </a:fillRef>
+          <a:effectRef idx="0">
+            <a:schemeClr val="accent1"/>
+          </a:effectRef>
+          <a:fontRef idx="minor">
+            <a:schemeClr val="tx1"/>
+          </a:fontRef>
+        </p:style>
+      </p:cxnSp>
+      <p:pic>
+        <p:nvPicPr>
+          <p:cNvPr id="7" name="Picture 6">
+            <a:extLst>
+              <a:ext uri="{FF2B5EF4-FFF2-40B4-BE49-F238E27FC236}">
+                <a16:creationId xmlns:a16="http://schemas.microsoft.com/office/drawing/2014/main" id="{8F16447E-6C5E-C346-87A6-603B70E13B93}"/>
+              </a:ext>
+            </a:extLst>
+          </p:cNvPr>
+          <p:cNvPicPr>
+            <a:picLocks noChangeAspect="1"/>
+          </p:cNvPicPr>
+          <p:nvPr/>
+        </p:nvPicPr>
+        <p:blipFill>
+          <a:blip r:embed="rId2"/>
+          <a:stretch>
+            <a:fillRect/>
+          </a:stretch>
+        </p:blipFill>
+        <p:spPr>
+          <a:xfrm>
+            <a:off x="367743" y="450850"/>
+            <a:ext cx="11456497" cy="6072222"/>
+          </a:xfrm>
+          <a:prstGeom prst="rect">
+            <a:avLst/>
+          </a:prstGeom>
+        </p:spPr>
+      </p:pic>
+    </p:spTree>
+    <p:extLst>
+      <p:ext uri="{BB962C8B-B14F-4D97-AF65-F5344CB8AC3E}">
+        <p14:creationId xmlns:p14="http://schemas.microsoft.com/office/powerpoint/2010/main" val="2709200212"/>
+      </p:ext>
+    </p:extLst>
+  </p:cSld>
+  <p:clrMapOvr>
+    <a:masterClrMapping/>
+  </p:clrMapOvr>
+</p:sld>
+</file>
+
+<file path=ppt/slides/slide7.xml><?xml version="1.0" encoding="utf-8"?>
+<p:sld xmlns:a="http://schemas.openxmlformats.org/drawingml/2006/main" xmlns:r="http://schemas.openxmlformats.org/officeDocument/2006/relationships" xmlns:p="http://schemas.openxmlformats.org/presentationml/2006/main">
+  <p:cSld>
+    <p:spTree>
+      <p:nvGrpSpPr>
+        <p:cNvPr id="1" name=""/>
+        <p:cNvGrpSpPr/>
+        <p:nvPr/>
+      </p:nvGrpSpPr>
+      <p:grpSpPr>
+        <a:xfrm>
+          <a:off x="0" y="0"/>
+          <a:ext cx="0" cy="0"/>
+          <a:chOff x="0" y="0"/>
+          <a:chExt cx="0" cy="0"/>
+        </a:xfrm>
+      </p:grpSpPr>
+      <p:sp>
+        <p:nvSpPr>
+          <p:cNvPr id="2" name="Title 1">
+            <a:extLst>
+              <a:ext uri="{FF2B5EF4-FFF2-40B4-BE49-F238E27FC236}">
                 <a16:creationId xmlns:a16="http://schemas.microsoft.com/office/drawing/2014/main" id="{B6C88970-652A-9046-B1B3-6E9D53D30F5F}"/>
               </a:ext>
             </a:extLst>
@@ -5630,7 +6628,7 @@
 </p:sld>
 </file>
 
-<file path=ppt/slides/slide5.xml><?xml version="1.0" encoding="utf-8"?>
+<file path=ppt/slides/slide8.xml><?xml version="1.0" encoding="utf-8"?>
 <p:sld xmlns:a="http://schemas.openxmlformats.org/drawingml/2006/main" xmlns:r="http://schemas.openxmlformats.org/officeDocument/2006/relationships" xmlns:p="http://schemas.openxmlformats.org/presentationml/2006/main">
   <p:cSld>
     <p:spTree>
@@ -5720,7 +6718,7 @@
 </p:sld>
 </file>
 
-<file path=ppt/slides/slide6.xml><?xml version="1.0" encoding="utf-8"?>
+<file path=ppt/slides/slide9.xml><?xml version="1.0" encoding="utf-8"?>
 <p:sld xmlns:a="http://schemas.openxmlformats.org/drawingml/2006/main" xmlns:r="http://schemas.openxmlformats.org/officeDocument/2006/relationships" xmlns:p="http://schemas.openxmlformats.org/presentationml/2006/main">
   <p:cSld>
     <p:spTree>
@@ -5801,359 +6799,6 @@
     <p:extLst>
       <p:ext uri="{BB962C8B-B14F-4D97-AF65-F5344CB8AC3E}">
         <p14:creationId xmlns:p14="http://schemas.microsoft.com/office/powerpoint/2010/main" val="1479822141"/>
-      </p:ext>
-    </p:extLst>
-  </p:cSld>
-  <p:clrMapOvr>
-    <a:masterClrMapping/>
-  </p:clrMapOvr>
-</p:sld>
-</file>
-
-<file path=ppt/slides/slide7.xml><?xml version="1.0" encoding="utf-8"?>
-<p:sld xmlns:a="http://schemas.openxmlformats.org/drawingml/2006/main" xmlns:r="http://schemas.openxmlformats.org/officeDocument/2006/relationships" xmlns:p="http://schemas.openxmlformats.org/presentationml/2006/main">
-  <p:cSld>
-    <p:spTree>
-      <p:nvGrpSpPr>
-        <p:cNvPr id="1" name=""/>
-        <p:cNvGrpSpPr/>
-        <p:nvPr/>
-      </p:nvGrpSpPr>
-      <p:grpSpPr>
-        <a:xfrm>
-          <a:off x="0" y="0"/>
-          <a:ext cx="0" cy="0"/>
-          <a:chOff x="0" y="0"/>
-          <a:chExt cx="0" cy="0"/>
-        </a:xfrm>
-      </p:grpSpPr>
-      <p:sp>
-        <p:nvSpPr>
-          <p:cNvPr id="2" name="Title 1">
-            <a:extLst>
-              <a:ext uri="{FF2B5EF4-FFF2-40B4-BE49-F238E27FC236}">
-                <a16:creationId xmlns:a16="http://schemas.microsoft.com/office/drawing/2014/main" id="{D34F24D6-8A10-774E-AE11-9CF63D3FAEBD}"/>
-              </a:ext>
-            </a:extLst>
-          </p:cNvPr>
-          <p:cNvSpPr>
-            <a:spLocks noGrp="1"/>
-          </p:cNvSpPr>
-          <p:nvPr>
-            <p:ph type="title"/>
-          </p:nvPr>
-        </p:nvSpPr>
-        <p:spPr/>
-        <p:txBody>
-          <a:bodyPr/>
-          <a:lstStyle/>
-          <a:p>
-            <a:r>
-              <a:rPr lang="en-US" dirty="0"/>
-              <a:t>Top and Bottom 5 By Noise Pollution</a:t>
-            </a:r>
-          </a:p>
-        </p:txBody>
-      </p:sp>
-      <p:pic>
-        <p:nvPicPr>
-          <p:cNvPr id="7" name="Content Placeholder 6">
-            <a:extLst>
-              <a:ext uri="{FF2B5EF4-FFF2-40B4-BE49-F238E27FC236}">
-                <a16:creationId xmlns:a16="http://schemas.microsoft.com/office/drawing/2014/main" id="{6F777144-12B6-E54A-B95A-0EB6A3B083E7}"/>
-              </a:ext>
-            </a:extLst>
-          </p:cNvPr>
-          <p:cNvPicPr>
-            <a:picLocks noGrp="1" noChangeAspect="1"/>
-          </p:cNvPicPr>
-          <p:nvPr>
-            <p:ph idx="1"/>
-          </p:nvPr>
-        </p:nvPicPr>
-        <p:blipFill>
-          <a:blip r:embed="rId2"/>
-          <a:stretch>
-            <a:fillRect/>
-          </a:stretch>
-        </p:blipFill>
-        <p:spPr>
-          <a:xfrm>
-            <a:off x="671513" y="1878345"/>
-            <a:ext cx="10101261" cy="4636755"/>
-          </a:xfrm>
-          <a:prstGeom prst="rect">
-            <a:avLst/>
-          </a:prstGeom>
-        </p:spPr>
-      </p:pic>
-    </p:spTree>
-    <p:extLst>
-      <p:ext uri="{BB962C8B-B14F-4D97-AF65-F5344CB8AC3E}">
-        <p14:creationId xmlns:p14="http://schemas.microsoft.com/office/powerpoint/2010/main" val="705211387"/>
-      </p:ext>
-    </p:extLst>
-  </p:cSld>
-  <p:clrMapOvr>
-    <a:masterClrMapping/>
-  </p:clrMapOvr>
-</p:sld>
-</file>
-
-<file path=ppt/slides/slide8.xml><?xml version="1.0" encoding="utf-8"?>
-<p:sld xmlns:a="http://schemas.openxmlformats.org/drawingml/2006/main" xmlns:r="http://schemas.openxmlformats.org/officeDocument/2006/relationships" xmlns:p="http://schemas.openxmlformats.org/presentationml/2006/main">
-  <p:cSld>
-    <p:spTree>
-      <p:nvGrpSpPr>
-        <p:cNvPr id="1" name=""/>
-        <p:cNvGrpSpPr/>
-        <p:nvPr/>
-      </p:nvGrpSpPr>
-      <p:grpSpPr>
-        <a:xfrm>
-          <a:off x="0" y="0"/>
-          <a:ext cx="0" cy="0"/>
-          <a:chOff x="0" y="0"/>
-          <a:chExt cx="0" cy="0"/>
-        </a:xfrm>
-      </p:grpSpPr>
-      <p:sp>
-        <p:nvSpPr>
-          <p:cNvPr id="2" name="Title 1">
-            <a:extLst>
-              <a:ext uri="{FF2B5EF4-FFF2-40B4-BE49-F238E27FC236}">
-                <a16:creationId xmlns:a16="http://schemas.microsoft.com/office/drawing/2014/main" id="{2F2BA9B1-A85B-E14F-B9BC-06DEFE65A80E}"/>
-              </a:ext>
-            </a:extLst>
-          </p:cNvPr>
-          <p:cNvSpPr>
-            <a:spLocks noGrp="1"/>
-          </p:cNvSpPr>
-          <p:nvPr>
-            <p:ph type="title"/>
-          </p:nvPr>
-        </p:nvSpPr>
-        <p:spPr/>
-        <p:txBody>
-          <a:bodyPr/>
-          <a:lstStyle/>
-          <a:p>
-            <a:r>
-              <a:rPr lang="en-US" dirty="0"/>
-              <a:t>Conclusions</a:t>
-            </a:r>
-          </a:p>
-        </p:txBody>
-      </p:sp>
-      <p:sp>
-        <p:nvSpPr>
-          <p:cNvPr id="3" name="Content Placeholder 2">
-            <a:extLst>
-              <a:ext uri="{FF2B5EF4-FFF2-40B4-BE49-F238E27FC236}">
-                <a16:creationId xmlns:a16="http://schemas.microsoft.com/office/drawing/2014/main" id="{A40618CF-0621-6343-9D40-9584B8A09BE9}"/>
-              </a:ext>
-            </a:extLst>
-          </p:cNvPr>
-          <p:cNvSpPr>
-            <a:spLocks noGrp="1"/>
-          </p:cNvSpPr>
-          <p:nvPr>
-            <p:ph idx="1"/>
-          </p:nvPr>
-        </p:nvSpPr>
-        <p:spPr/>
-        <p:txBody>
-          <a:bodyPr>
-            <a:normAutofit fontScale="77500" lnSpcReduction="20000"/>
-          </a:bodyPr>
-          <a:lstStyle/>
-          <a:p>
-            <a:r>
-              <a:rPr lang="en-US" dirty="0"/>
-              <a:t>Not all cheap neighborhoods are noise free. </a:t>
-            </a:r>
-          </a:p>
-          <a:p>
-            <a:r>
-              <a:rPr lang="en-US" dirty="0"/>
-              <a:t>Some of the noisiest neighborhoods are the most expensive.</a:t>
-            </a:r>
-          </a:p>
-          <a:p>
-            <a:r>
-              <a:rPr lang="en-US" dirty="0"/>
-              <a:t>I looked at the bottom 5 in both sets and identified 'Borough Park’ and 'Bath Beach/Bensonhurst’ as very affordable and very low noise level neighborhoods. If I were looking to rent, with noise pollution being a key factor in rental location, I would definitely further researched “Borough Park’ as an area closest to Manhattan. </a:t>
-            </a:r>
-          </a:p>
-          <a:p>
-            <a:r>
-              <a:rPr lang="en-US" dirty="0"/>
-              <a:t>If selection is increased to the bottom 10, the following new names appear: 'Canarsie', '</a:t>
-            </a:r>
-            <a:r>
-              <a:rPr lang="en-US" dirty="0" err="1"/>
-              <a:t>Vanderveer</a:t>
-            </a:r>
-            <a:r>
-              <a:rPr lang="en-US" dirty="0"/>
-              <a:t>/Flatbush', 'Gravesend/</a:t>
-            </a:r>
-            <a:r>
-              <a:rPr lang="en-US" dirty="0" err="1"/>
-              <a:t>Homecrest</a:t>
-            </a:r>
-            <a:r>
-              <a:rPr lang="en-US" dirty="0"/>
-              <a:t>’. </a:t>
-            </a:r>
-          </a:p>
-          <a:p>
-            <a:r>
-              <a:rPr lang="en-US" dirty="0"/>
-              <a:t>I did not find any correlation between level of noise and rent prices in this research.</a:t>
-            </a:r>
-          </a:p>
-          <a:p>
-            <a:r>
-              <a:rPr lang="en-US" dirty="0"/>
-              <a:t>Noise pollution in NYC is an issue which varies from neighborhood to neighborhood and needs to be further researched.</a:t>
-            </a:r>
-          </a:p>
-        </p:txBody>
-      </p:sp>
-    </p:spTree>
-    <p:extLst>
-      <p:ext uri="{BB962C8B-B14F-4D97-AF65-F5344CB8AC3E}">
-        <p14:creationId xmlns:p14="http://schemas.microsoft.com/office/powerpoint/2010/main" val="2403573745"/>
-      </p:ext>
-    </p:extLst>
-  </p:cSld>
-  <p:clrMapOvr>
-    <a:masterClrMapping/>
-  </p:clrMapOvr>
-</p:sld>
-</file>
-
-<file path=ppt/slides/slide9.xml><?xml version="1.0" encoding="utf-8"?>
-<p:sld xmlns:a="http://schemas.openxmlformats.org/drawingml/2006/main" xmlns:r="http://schemas.openxmlformats.org/officeDocument/2006/relationships" xmlns:p="http://schemas.openxmlformats.org/presentationml/2006/main">
-  <p:cSld>
-    <p:spTree>
-      <p:nvGrpSpPr>
-        <p:cNvPr id="1" name=""/>
-        <p:cNvGrpSpPr/>
-        <p:nvPr/>
-      </p:nvGrpSpPr>
-      <p:grpSpPr>
-        <a:xfrm>
-          <a:off x="0" y="0"/>
-          <a:ext cx="0" cy="0"/>
-          <a:chOff x="0" y="0"/>
-          <a:chExt cx="0" cy="0"/>
-        </a:xfrm>
-      </p:grpSpPr>
-      <p:sp>
-        <p:nvSpPr>
-          <p:cNvPr id="2" name="Title 1">
-            <a:extLst>
-              <a:ext uri="{FF2B5EF4-FFF2-40B4-BE49-F238E27FC236}">
-                <a16:creationId xmlns:a16="http://schemas.microsoft.com/office/drawing/2014/main" id="{8D90C3CF-3B46-4746-8C39-1C5696AB4FB6}"/>
-              </a:ext>
-            </a:extLst>
-          </p:cNvPr>
-          <p:cNvSpPr>
-            <a:spLocks noGrp="1"/>
-          </p:cNvSpPr>
-          <p:nvPr>
-            <p:ph type="title"/>
-          </p:nvPr>
-        </p:nvSpPr>
-        <p:spPr/>
-        <p:txBody>
-          <a:bodyPr/>
-          <a:lstStyle/>
-          <a:p>
-            <a:r>
-              <a:rPr lang="en-US" dirty="0"/>
-              <a:t>Future research</a:t>
-            </a:r>
-          </a:p>
-        </p:txBody>
-      </p:sp>
-      <p:sp>
-        <p:nvSpPr>
-          <p:cNvPr id="3" name="Content Placeholder 2">
-            <a:extLst>
-              <a:ext uri="{FF2B5EF4-FFF2-40B4-BE49-F238E27FC236}">
-                <a16:creationId xmlns:a16="http://schemas.microsoft.com/office/drawing/2014/main" id="{9E00F9F2-2FD5-D04F-B558-C82D29C7211A}"/>
-              </a:ext>
-            </a:extLst>
-          </p:cNvPr>
-          <p:cNvSpPr>
-            <a:spLocks noGrp="1"/>
-          </p:cNvSpPr>
-          <p:nvPr>
-            <p:ph idx="1"/>
-          </p:nvPr>
-        </p:nvSpPr>
-        <p:spPr/>
-        <p:txBody>
-          <a:bodyPr>
-            <a:normAutofit lnSpcReduction="10000"/>
-          </a:bodyPr>
-          <a:lstStyle/>
-          <a:p>
-            <a:r>
-              <a:rPr lang="en-US" dirty="0"/>
-              <a:t>Analyze more neighborhoods in other boroughs. </a:t>
-            </a:r>
-          </a:p>
-          <a:p>
-            <a:r>
-              <a:rPr lang="en-US" dirty="0"/>
-              <a:t>Can we find correlations with other types of complaints?</a:t>
-            </a:r>
-          </a:p>
-          <a:p>
-            <a:r>
-              <a:rPr lang="en-US" dirty="0"/>
-              <a:t>Add interactive map where users can select a type of complaint and the map will show color coded </a:t>
-            </a:r>
-            <a:r>
-              <a:rPr lang="en-US" dirty="0" err="1"/>
-              <a:t>inofrmation</a:t>
-            </a:r>
-            <a:r>
-              <a:rPr lang="en-US" dirty="0"/>
-              <a:t>.</a:t>
-            </a:r>
-          </a:p>
-          <a:p>
-            <a:r>
-              <a:rPr lang="en-US" dirty="0"/>
-              <a:t>I only had time to do this analysis for Noise related issues, but would be interesting to see other complaints.</a:t>
-            </a:r>
-          </a:p>
-          <a:p>
-            <a:r>
-              <a:rPr lang="en-US" dirty="0"/>
-              <a:t>Identify the source of noise by correlation with business, entertainment, restaurants and bars.</a:t>
-            </a:r>
-          </a:p>
-          <a:p>
-            <a:endParaRPr lang="en-US" dirty="0"/>
-          </a:p>
-          <a:p>
-            <a:endParaRPr lang="en-US" dirty="0"/>
-          </a:p>
-          <a:p>
-            <a:endParaRPr lang="en-US" dirty="0"/>
-          </a:p>
-        </p:txBody>
-      </p:sp>
-    </p:spTree>
-    <p:extLst>
-      <p:ext uri="{BB962C8B-B14F-4D97-AF65-F5344CB8AC3E}">
-        <p14:creationId xmlns:p14="http://schemas.microsoft.com/office/powerpoint/2010/main" val="81433375"/>
       </p:ext>
     </p:extLst>
   </p:cSld>

</xml_diff>